<commit_message>
Banner de Estagio 1 Referencia PixBay
</commit_message>
<xml_diff>
--- a/MODELO_POSTER_FESTIVAL_SOFTWARE_2019.1-azul.pptx
+++ b/MODELO_POSTER_FESTIVAL_SOFTWARE_2019.1-azul.pptx
@@ -192,7 +192,7 @@
           <a:bodyPr lIns="0" rIns="0" tIns="0" bIns="0" anchor="b"/>
           <a:p>
             <a:pPr algn="r"/>
-            <a:fld id="{2C3571F1-14DE-49DB-9825-3E052FEECCE1}" type="slidenum">
+            <a:fld id="{4B9B824E-6453-4880-B66A-A74E23AF09B3}" type="slidenum">
               <a:rPr b="0" lang="pt-BR" sz="1400" spc="-1" strike="noStrike">
                 <a:latin typeface="Times New Roman"/>
               </a:rPr>
@@ -260,7 +260,7 @@
                 <a:spcPct val="100000"/>
               </a:lnSpc>
             </a:pPr>
-            <a:fld id="{59837F88-7618-4252-9047-211D004CDA8D}" type="slidenum">
+            <a:fld id="{E4D77689-955C-42C1-BF20-A73554ABF6DC}" type="slidenum">
               <a:rPr b="0" lang="pt-BR" sz="1200" spc="-1" strike="noStrike">
                 <a:solidFill>
                   <a:srgbClr val="000000"/>
@@ -2708,7 +2708,7 @@
                 <a:latin typeface="Arial"/>
                 <a:ea typeface="ＭＳ Ｐゴシック"/>
               </a:rPr>
-              <a:t>O processo criação e desenvolvimento passou por diversas etapas, indo desde a apresentação de ideias e artes de conceito até o teste com usuários para retorno e melhorias. Foram criadas contas em aplicações como Trello, Youtube e GitHub, para fazer acompanhamento, publicação e controle de versão de diversos passos do processo de desenvolvimento. Partindo da apresentação da arte de conceito e vídeos que pudessem explicar o jogo e sua inspiração seguiu-se a criação da documentação inicial do jogo contendo enredo, personagens e outros elementos, seguido da preparação de “historias de usuário” que ajudariam a definir os passos seguintes. Em meio a isso estava também a busca por imagens para inimigos, personagens, cenários e por fim o áudio em sites que contivessem esses elementos disponibilizados de forma gratuita. Ao juntar tudo, novo teste e melhorias para alcançar a versão final. A parte do som foi uma das mais desafiadoras, pois era preciso encontrar um áudio[4] compatível com a fase. O jogo foi desenvolvido utilizando a linguagem Lua e o framework Corona SDK. Através dos exemplos do site oficial do Corona, da documentação do mesmo[1] e da troca de experiência com outros alunos foi possível o desenvolvimento e a resolução de alguns problemas que surgiram durante o processo. A Orientação a Objetos em certos elementos ajudou a simplificar algumas ações. Para esse uso  alguns sites contribuíram como: “Lua Users”[2] e “Tutorials Point”[3].</a:t>
+              <a:t>O processo criação e desenvolvimento passou por diversas etapas, indo desde a apresentação de ideias e artes de conceito até o teste com usuários para retorno e melhorias. Foram criadas contas em aplicações como Trello, Youtube e GitHub, para fazer acompanhamento, publicação e controle de versão de diversos passos do processo de desenvolvimento. Partindo da apresentação da arte de conceito e vídeos que pudessem explicar o jogo e sua inspiração seguiu-se a criação da documentação inicial do jogo contendo enredo, personagens e outros elementos, seguido da preparação de “historias de usuário” que ajudariam a definir os passos seguintes. Em meio a isso estava também a busca por imagens para inimigos, personagens, cenários[5] e por fim o áudio em sites que contivessem esses elementos disponibilizados de forma gratuita. Ao juntar tudo, novo teste e melhorias para alcançar a versão final. A parte do som foi uma das mais desafiadoras, pois era preciso encontrar um áudio[4] compatível com a fase. O jogo foi desenvolvido utilizando a linguagem Lua e o framework Corona SDK. Através dos exemplos do site oficial do Corona, da documentação do mesmo[1] e da troca de experiência com outros alunos foi possível o desenvolvimento e a resolução de alguns problemas que surgiram durante o processo. A Orientação a Objetos em certos elementos ajudou a simplificar algumas ações. Para esse uso  alguns sites contribuíram como: “Lua Users”[2] e “Tutorials Point”[3].</a:t>
             </a:r>
             <a:endParaRPr b="0" lang="pt-BR" sz="2800" spc="-1" strike="noStrike">
               <a:latin typeface="Arial"/>
@@ -3020,6 +3020,27 @@
                 <a:hlinkClick r:id="rId14"/>
               </a:rPr>
               <a:t>/</a:t>
+            </a:r>
+            <a:endParaRPr b="0" lang="pt-BR" sz="2800" spc="-1" strike="noStrike">
+              <a:latin typeface="Arial"/>
+            </a:endParaRPr>
+          </a:p>
+          <a:p>
+            <a:pPr algn="just">
+              <a:lnSpc>
+                <a:spcPct val="150000"/>
+              </a:lnSpc>
+            </a:pPr>
+            <a:r>
+              <a:rPr b="0" lang="pt-BR" sz="2800" spc="-1" strike="noStrike" u="sng">
+                <a:solidFill>
+                  <a:srgbClr val="009999"/>
+                </a:solidFill>
+                <a:uFillTx/>
+                <a:latin typeface="Arial"/>
+                <a:ea typeface="ＭＳ Ｐゴシック"/>
+              </a:rPr>
+              <a:t>[5] https://pixabay.com</a:t>
             </a:r>
             <a:endParaRPr b="0" lang="pt-BR" sz="2800" spc="-1" strike="noStrike">
               <a:latin typeface="Arial"/>

</xml_diff>